<commit_message>
revise speed dating logistic assignment
</commit_message>
<xml_diff>
--- a/lectures/regularization/regularization-pres.pptx
+++ b/lectures/regularization/regularization-pres.pptx
@@ -253,7 +253,7 @@
           <a:p>
             <a:fld id="{A0051175-48D2-40DF-A56C-712B09FFEBD8}" type="datetimeFigureOut">
               <a:rPr lang="en-US" smtClean="0"/>
-              <a:t>7/11/2016</a:t>
+              <a:t>7/14/2016</a:t>
             </a:fld>
             <a:endParaRPr lang="en-US"/>
           </a:p>
@@ -423,7 +423,7 @@
           <a:p>
             <a:fld id="{A0051175-48D2-40DF-A56C-712B09FFEBD8}" type="datetimeFigureOut">
               <a:rPr lang="en-US" smtClean="0"/>
-              <a:t>7/11/2016</a:t>
+              <a:t>7/14/2016</a:t>
             </a:fld>
             <a:endParaRPr lang="en-US"/>
           </a:p>
@@ -603,7 +603,7 @@
           <a:p>
             <a:fld id="{A0051175-48D2-40DF-A56C-712B09FFEBD8}" type="datetimeFigureOut">
               <a:rPr lang="en-US" smtClean="0"/>
-              <a:t>7/11/2016</a:t>
+              <a:t>7/14/2016</a:t>
             </a:fld>
             <a:endParaRPr lang="en-US"/>
           </a:p>
@@ -773,7 +773,7 @@
           <a:p>
             <a:fld id="{A0051175-48D2-40DF-A56C-712B09FFEBD8}" type="datetimeFigureOut">
               <a:rPr lang="en-US" smtClean="0"/>
-              <a:t>7/11/2016</a:t>
+              <a:t>7/14/2016</a:t>
             </a:fld>
             <a:endParaRPr lang="en-US"/>
           </a:p>
@@ -1017,7 +1017,7 @@
           <a:p>
             <a:fld id="{A0051175-48D2-40DF-A56C-712B09FFEBD8}" type="datetimeFigureOut">
               <a:rPr lang="en-US" smtClean="0"/>
-              <a:t>7/11/2016</a:t>
+              <a:t>7/14/2016</a:t>
             </a:fld>
             <a:endParaRPr lang="en-US"/>
           </a:p>
@@ -1249,7 +1249,7 @@
           <a:p>
             <a:fld id="{A0051175-48D2-40DF-A56C-712B09FFEBD8}" type="datetimeFigureOut">
               <a:rPr lang="en-US" smtClean="0"/>
-              <a:t>7/11/2016</a:t>
+              <a:t>7/14/2016</a:t>
             </a:fld>
             <a:endParaRPr lang="en-US"/>
           </a:p>
@@ -1616,7 +1616,7 @@
           <a:p>
             <a:fld id="{A0051175-48D2-40DF-A56C-712B09FFEBD8}" type="datetimeFigureOut">
               <a:rPr lang="en-US" smtClean="0"/>
-              <a:t>7/11/2016</a:t>
+              <a:t>7/14/2016</a:t>
             </a:fld>
             <a:endParaRPr lang="en-US"/>
           </a:p>
@@ -1734,7 +1734,7 @@
           <a:p>
             <a:fld id="{A0051175-48D2-40DF-A56C-712B09FFEBD8}" type="datetimeFigureOut">
               <a:rPr lang="en-US" smtClean="0"/>
-              <a:t>7/11/2016</a:t>
+              <a:t>7/14/2016</a:t>
             </a:fld>
             <a:endParaRPr lang="en-US"/>
           </a:p>
@@ -1829,7 +1829,7 @@
           <a:p>
             <a:fld id="{A0051175-48D2-40DF-A56C-712B09FFEBD8}" type="datetimeFigureOut">
               <a:rPr lang="en-US" smtClean="0"/>
-              <a:t>7/11/2016</a:t>
+              <a:t>7/14/2016</a:t>
             </a:fld>
             <a:endParaRPr lang="en-US"/>
           </a:p>
@@ -2106,7 +2106,7 @@
           <a:p>
             <a:fld id="{A0051175-48D2-40DF-A56C-712B09FFEBD8}" type="datetimeFigureOut">
               <a:rPr lang="en-US" smtClean="0"/>
-              <a:t>7/11/2016</a:t>
+              <a:t>7/14/2016</a:t>
             </a:fld>
             <a:endParaRPr lang="en-US"/>
           </a:p>
@@ -2363,7 +2363,7 @@
           <a:p>
             <a:fld id="{A0051175-48D2-40DF-A56C-712B09FFEBD8}" type="datetimeFigureOut">
               <a:rPr lang="en-US" smtClean="0"/>
-              <a:t>7/11/2016</a:t>
+              <a:t>7/14/2016</a:t>
             </a:fld>
             <a:endParaRPr lang="en-US"/>
           </a:p>
@@ -2576,7 +2576,7 @@
           <a:p>
             <a:fld id="{A0051175-48D2-40DF-A56C-712B09FFEBD8}" type="datetimeFigureOut">
               <a:rPr lang="en-US" smtClean="0"/>
-              <a:t>7/11/2016</a:t>
+              <a:t>7/14/2016</a:t>
             </a:fld>
             <a:endParaRPr lang="en-US"/>
           </a:p>
@@ -3731,8 +3731,16 @@
           <a:p>
             <a:pPr lvl="1"/>
             <a:r>
-              <a:rPr lang="en-US" dirty="0" smtClean="0"/>
-              <a:t>Called “lasso” or “</a:t>
+              <a:rPr lang="en-US" smtClean="0"/>
+              <a:t>Called </a:t>
+            </a:r>
+            <a:r>
+              <a:rPr lang="en-US" smtClean="0"/>
+              <a:t>“LASSO” </a:t>
+            </a:r>
+            <a:r>
+              <a:rPr lang="en-US" dirty="0" smtClean="0"/>
+              <a:t>or “</a:t>
             </a:r>
             <a:r>
               <a:rPr lang="en-US" i="1" dirty="0" smtClean="0"/>

</xml_diff>